<commit_message>
application customised for ING
</commit_message>
<xml_diff>
--- a/automated_functional_testing.pptx
+++ b/automated_functional_testing.pptx
@@ -5,7 +5,7 @@
     <p:sldMasterId id="2147483659" r:id="rId1"/>
   </p:sldMasterIdLst>
   <p:notesMasterIdLst>
-    <p:notesMasterId r:id="rId12"/>
+    <p:notesMasterId r:id="rId13"/>
   </p:notesMasterIdLst>
   <p:sldIdLst>
     <p:sldId id="256" r:id="rId2"/>
@@ -17,36 +17,37 @@
     <p:sldId id="267" r:id="rId8"/>
     <p:sldId id="260" r:id="rId9"/>
     <p:sldId id="268" r:id="rId10"/>
-    <p:sldId id="263" r:id="rId11"/>
+    <p:sldId id="269" r:id="rId11"/>
+    <p:sldId id="263" r:id="rId12"/>
   </p:sldIdLst>
   <p:sldSz cx="9144000" cy="5143500" type="screen16x9"/>
   <p:notesSz cx="6858000" cy="9144000"/>
   <p:embeddedFontLst>
     <p:embeddedFont>
       <p:font typeface="Calibri" panose="020F0502020204030204" pitchFamily="34" charset="0"/>
-      <p:regular r:id="rId13"/>
-      <p:bold r:id="rId14"/>
-      <p:italic r:id="rId15"/>
-      <p:boldItalic r:id="rId16"/>
+      <p:regular r:id="rId14"/>
+      <p:bold r:id="rId15"/>
+      <p:italic r:id="rId16"/>
+      <p:boldItalic r:id="rId17"/>
     </p:embeddedFont>
     <p:embeddedFont>
       <p:font typeface="Lato" panose="020F0502020204030203" pitchFamily="34" charset="77"/>
-      <p:regular r:id="rId17"/>
-      <p:bold r:id="rId18"/>
-      <p:italic r:id="rId19"/>
-      <p:boldItalic r:id="rId20"/>
+      <p:regular r:id="rId18"/>
+      <p:bold r:id="rId19"/>
+      <p:italic r:id="rId20"/>
+      <p:boldItalic r:id="rId21"/>
     </p:embeddedFont>
     <p:embeddedFont>
       <p:font typeface="Montserrat" pitchFamily="2" charset="77"/>
-      <p:regular r:id="rId21"/>
-      <p:bold r:id="rId22"/>
-      <p:italic r:id="rId23"/>
-      <p:boldItalic r:id="rId24"/>
+      <p:regular r:id="rId22"/>
+      <p:bold r:id="rId23"/>
+      <p:italic r:id="rId24"/>
+      <p:boldItalic r:id="rId25"/>
     </p:embeddedFont>
     <p:embeddedFont>
       <p:font typeface="Syncopate" panose="02000505000000020003" pitchFamily="2" charset="0"/>
-      <p:regular r:id="rId25"/>
-      <p:bold r:id="rId26"/>
+      <p:regular r:id="rId26"/>
+      <p:bold r:id="rId27"/>
     </p:embeddedFont>
   </p:embeddedFontLst>
   <p:defaultTextStyle>
@@ -646,6 +647,112 @@
 </file>
 
 <file path=ppt/notesSlides/notesSlide10.xml><?xml version="1.0" encoding="utf-8"?>
+<p:notes xmlns:a="http://schemas.openxmlformats.org/drawingml/2006/main" xmlns:r="http://schemas.openxmlformats.org/officeDocument/2006/relationships" xmlns:p="http://schemas.openxmlformats.org/presentationml/2006/main" showMasterSp="0" showMasterPhAnim="0">
+  <p:cSld>
+    <p:spTree>
+      <p:nvGrpSpPr>
+        <p:cNvPr id="1" name="Shape 171"/>
+        <p:cNvGrpSpPr/>
+        <p:nvPr/>
+      </p:nvGrpSpPr>
+      <p:grpSpPr>
+        <a:xfrm>
+          <a:off x="0" y="0"/>
+          <a:ext cx="0" cy="0"/>
+          <a:chOff x="0" y="0"/>
+          <a:chExt cx="0" cy="0"/>
+        </a:xfrm>
+      </p:grpSpPr>
+      <p:sp>
+        <p:nvSpPr>
+          <p:cNvPr id="172" name="Shape 172"/>
+          <p:cNvSpPr>
+            <a:spLocks noGrp="1" noRot="1" noChangeAspect="1"/>
+          </p:cNvSpPr>
+          <p:nvPr>
+            <p:ph type="sldImg" idx="2"/>
+          </p:nvPr>
+        </p:nvSpPr>
+        <p:spPr>
+          <a:xfrm>
+            <a:off x="381000" y="685800"/>
+            <a:ext cx="6096000" cy="3429000"/>
+          </a:xfrm>
+          <a:custGeom>
+            <a:avLst/>
+            <a:gdLst/>
+            <a:ahLst/>
+            <a:cxnLst/>
+            <a:rect l="0" t="0" r="0" b="0"/>
+            <a:pathLst>
+              <a:path w="120000" h="120000" extrusionOk="0">
+                <a:moveTo>
+                  <a:pt x="0" y="0"/>
+                </a:moveTo>
+                <a:lnTo>
+                  <a:pt x="120000" y="0"/>
+                </a:lnTo>
+                <a:lnTo>
+                  <a:pt x="120000" y="120000"/>
+                </a:lnTo>
+                <a:lnTo>
+                  <a:pt x="0" y="120000"/>
+                </a:lnTo>
+                <a:close/>
+              </a:path>
+            </a:pathLst>
+          </a:custGeom>
+        </p:spPr>
+      </p:sp>
+      <p:sp>
+        <p:nvSpPr>
+          <p:cNvPr id="173" name="Shape 173"/>
+          <p:cNvSpPr txBox="1">
+            <a:spLocks noGrp="1"/>
+          </p:cNvSpPr>
+          <p:nvPr>
+            <p:ph type="body" idx="1"/>
+          </p:nvPr>
+        </p:nvSpPr>
+        <p:spPr>
+          <a:xfrm>
+            <a:off x="685800" y="4343400"/>
+            <a:ext cx="5486400" cy="4114800"/>
+          </a:xfrm>
+          <a:prstGeom prst="rect">
+            <a:avLst/>
+          </a:prstGeom>
+        </p:spPr>
+        <p:txBody>
+          <a:bodyPr wrap="square" lIns="91425" tIns="91425" rIns="91425" bIns="91425" anchor="t" anchorCtr="0">
+            <a:noAutofit/>
+          </a:bodyPr>
+          <a:lstStyle/>
+          <a:p>
+            <a:pPr marL="0" lvl="0" indent="0" rtl="0">
+              <a:spcBef>
+                <a:spcPts val="0"/>
+              </a:spcBef>
+              <a:buNone/>
+            </a:pPr>
+            <a:endParaRPr/>
+          </a:p>
+        </p:txBody>
+      </p:sp>
+    </p:spTree>
+    <p:extLst>
+      <p:ext uri="{BB962C8B-B14F-4D97-AF65-F5344CB8AC3E}">
+        <p14:creationId xmlns:p14="http://schemas.microsoft.com/office/powerpoint/2010/main" val="1491623723"/>
+      </p:ext>
+    </p:extLst>
+  </p:cSld>
+  <p:clrMapOvr>
+    <a:masterClrMapping/>
+  </p:clrMapOvr>
+</p:notes>
+</file>
+
+<file path=ppt/notesSlides/notesSlide11.xml><?xml version="1.0" encoding="utf-8"?>
 <p:notes xmlns:a="http://schemas.openxmlformats.org/drawingml/2006/main" xmlns:r="http://schemas.openxmlformats.org/officeDocument/2006/relationships" xmlns:p="http://schemas.openxmlformats.org/presentationml/2006/main" showMasterSp="0" showMasterPhAnim="0">
   <p:cSld>
     <p:spTree>
@@ -8728,6 +8835,168 @@
     </p:bg>
     <p:spTree>
       <p:nvGrpSpPr>
+        <p:cNvPr id="1" name="Shape 174"/>
+        <p:cNvGrpSpPr/>
+        <p:nvPr/>
+      </p:nvGrpSpPr>
+      <p:grpSpPr>
+        <a:xfrm>
+          <a:off x="0" y="0"/>
+          <a:ext cx="0" cy="0"/>
+          <a:chOff x="0" y="0"/>
+          <a:chExt cx="0" cy="0"/>
+        </a:xfrm>
+      </p:grpSpPr>
+      <p:sp>
+        <p:nvSpPr>
+          <p:cNvPr id="175" name="Shape 175"/>
+          <p:cNvSpPr txBox="1">
+            <a:spLocks noGrp="1"/>
+          </p:cNvSpPr>
+          <p:nvPr>
+            <p:ph type="title" idx="4294967295"/>
+          </p:nvPr>
+        </p:nvSpPr>
+        <p:spPr>
+          <a:xfrm>
+            <a:off x="1297500" y="393750"/>
+            <a:ext cx="7038900" cy="914100"/>
+          </a:xfrm>
+          <a:prstGeom prst="rect">
+            <a:avLst/>
+          </a:prstGeom>
+        </p:spPr>
+        <p:txBody>
+          <a:bodyPr wrap="square" lIns="91425" tIns="91425" rIns="91425" bIns="91425" anchor="t" anchorCtr="0">
+            <a:noAutofit/>
+          </a:bodyPr>
+          <a:lstStyle/>
+          <a:p>
+            <a:pPr marL="0" lvl="0" indent="0" rtl="0">
+              <a:spcBef>
+                <a:spcPts val="0"/>
+              </a:spcBef>
+              <a:buNone/>
+            </a:pPr>
+            <a:r>
+              <a:rPr lang="en" dirty="0"/>
+              <a:t>User Story</a:t>
+            </a:r>
+          </a:p>
+        </p:txBody>
+      </p:sp>
+      <p:pic>
+        <p:nvPicPr>
+          <p:cNvPr id="176" name="Shape 176"/>
+          <p:cNvPicPr preferRelativeResize="0"/>
+          <p:nvPr/>
+        </p:nvPicPr>
+        <p:blipFill rotWithShape="1">
+          <a:blip r:embed="rId3">
+            <a:alphaModFix/>
+          </a:blip>
+          <a:srcRect b="59924"/>
+          <a:stretch/>
+        </p:blipFill>
+        <p:spPr>
+          <a:xfrm rot="10800000" flipH="1">
+            <a:off x="-163775" y="0"/>
+            <a:ext cx="1638476" cy="1307850"/>
+          </a:xfrm>
+          <a:prstGeom prst="rect">
+            <a:avLst/>
+          </a:prstGeom>
+          <a:noFill/>
+          <a:ln>
+            <a:noFill/>
+          </a:ln>
+        </p:spPr>
+      </p:pic>
+      <p:sp>
+        <p:nvSpPr>
+          <p:cNvPr id="3" name="TextBox 2">
+            <a:extLst>
+              <a:ext uri="{FF2B5EF4-FFF2-40B4-BE49-F238E27FC236}">
+                <a16:creationId xmlns:a16="http://schemas.microsoft.com/office/drawing/2014/main" id="{DF2AFA37-0B34-0543-9390-91325804E723}"/>
+              </a:ext>
+            </a:extLst>
+          </p:cNvPr>
+          <p:cNvSpPr txBox="1"/>
+          <p:nvPr/>
+        </p:nvSpPr>
+        <p:spPr>
+          <a:xfrm>
+            <a:off x="1344259" y="2315782"/>
+            <a:ext cx="6945382" cy="1569660"/>
+          </a:xfrm>
+          <a:prstGeom prst="rect">
+            <a:avLst/>
+          </a:prstGeom>
+          <a:solidFill>
+            <a:schemeClr val="bg1"/>
+          </a:solidFill>
+          <a:ln w="25400">
+            <a:solidFill>
+              <a:schemeClr val="tx1"/>
+            </a:solidFill>
+          </a:ln>
+        </p:spPr>
+        <p:txBody>
+          <a:bodyPr wrap="square" rtlCol="0" anchor="ctr">
+            <a:spAutoFit/>
+          </a:bodyPr>
+          <a:lstStyle/>
+          <a:p>
+            <a:pPr algn="ctr"/>
+            <a:endParaRPr lang="en-US" sz="2400" dirty="0">
+              <a:latin typeface="MS Reference Sans Serif" panose="020B0604030504040204" pitchFamily="34" charset="0"/>
+            </a:endParaRPr>
+          </a:p>
+          <a:p>
+            <a:pPr algn="ctr"/>
+            <a:r>
+              <a:rPr lang="en-US" sz="2400" dirty="0">
+                <a:latin typeface="MS Reference Sans Serif" panose="020B0604030504040204" pitchFamily="34" charset="0"/>
+              </a:rPr>
+              <a:t>As a client, I want to see both my debit and my credit cards listed on one screen</a:t>
+            </a:r>
+          </a:p>
+          <a:p>
+            <a:pPr algn="ctr"/>
+            <a:endParaRPr lang="en-US" sz="2400" dirty="0">
+              <a:latin typeface="MS Reference Sans Serif" panose="020B0604030504040204" pitchFamily="34" charset="0"/>
+            </a:endParaRPr>
+          </a:p>
+        </p:txBody>
+      </p:sp>
+    </p:spTree>
+    <p:extLst>
+      <p:ext uri="{BB962C8B-B14F-4D97-AF65-F5344CB8AC3E}">
+        <p14:creationId xmlns:p14="http://schemas.microsoft.com/office/powerpoint/2010/main" val="1245906423"/>
+      </p:ext>
+    </p:extLst>
+  </p:cSld>
+  <p:clrMapOvr>
+    <a:masterClrMapping/>
+  </p:clrMapOvr>
+</p:sld>
+</file>
+
+<file path=ppt/slides/slide11.xml><?xml version="1.0" encoding="utf-8"?>
+<p:sld xmlns:a="http://schemas.openxmlformats.org/drawingml/2006/main" xmlns:r="http://schemas.openxmlformats.org/officeDocument/2006/relationships" xmlns:p="http://schemas.openxmlformats.org/presentationml/2006/main">
+  <p:cSld>
+    <p:bg>
+      <p:bgPr>
+        <a:solidFill>
+          <a:schemeClr val="bg2">
+            <a:lumMod val="75000"/>
+          </a:schemeClr>
+        </a:solidFill>
+        <a:effectLst/>
+      </p:bgPr>
+    </p:bg>
+    <p:spTree>
+      <p:nvGrpSpPr>
         <p:cNvPr id="1" name="Shape 188"/>
         <p:cNvGrpSpPr/>
         <p:nvPr/>
@@ -12772,7 +13041,7 @@
             </a:pPr>
             <a:r>
               <a:rPr lang="en" dirty="0"/>
-              <a:t>Let’s See Some Code!</a:t>
+              <a:t>This is not what you’ve promised!</a:t>
             </a:r>
           </a:p>
         </p:txBody>

</xml_diff>

<commit_message>
fully working, all tests pass
</commit_message>
<xml_diff>
--- a/automated_functional_testing.pptx
+++ b/automated_functional_testing.pptx
@@ -5,49 +5,50 @@
     <p:sldMasterId id="2147483659" r:id="rId1"/>
   </p:sldMasterIdLst>
   <p:notesMasterIdLst>
-    <p:notesMasterId r:id="rId13"/>
+    <p:notesMasterId r:id="rId14"/>
   </p:notesMasterIdLst>
   <p:sldIdLst>
-    <p:sldId id="256" r:id="rId2"/>
-    <p:sldId id="266" r:id="rId3"/>
-    <p:sldId id="265" r:id="rId4"/>
-    <p:sldId id="258" r:id="rId5"/>
-    <p:sldId id="264" r:id="rId6"/>
-    <p:sldId id="259" r:id="rId7"/>
-    <p:sldId id="267" r:id="rId8"/>
-    <p:sldId id="260" r:id="rId9"/>
-    <p:sldId id="268" r:id="rId10"/>
-    <p:sldId id="269" r:id="rId11"/>
-    <p:sldId id="263" r:id="rId12"/>
+    <p:sldId id="270" r:id="rId2"/>
+    <p:sldId id="256" r:id="rId3"/>
+    <p:sldId id="266" r:id="rId4"/>
+    <p:sldId id="265" r:id="rId5"/>
+    <p:sldId id="258" r:id="rId6"/>
+    <p:sldId id="264" r:id="rId7"/>
+    <p:sldId id="259" r:id="rId8"/>
+    <p:sldId id="267" r:id="rId9"/>
+    <p:sldId id="260" r:id="rId10"/>
+    <p:sldId id="268" r:id="rId11"/>
+    <p:sldId id="269" r:id="rId12"/>
+    <p:sldId id="263" r:id="rId13"/>
   </p:sldIdLst>
   <p:sldSz cx="9144000" cy="5143500" type="screen16x9"/>
   <p:notesSz cx="6858000" cy="9144000"/>
   <p:embeddedFontLst>
     <p:embeddedFont>
       <p:font typeface="Calibri" panose="020F0502020204030204" pitchFamily="34" charset="0"/>
-      <p:regular r:id="rId14"/>
-      <p:bold r:id="rId15"/>
-      <p:italic r:id="rId16"/>
-      <p:boldItalic r:id="rId17"/>
+      <p:regular r:id="rId15"/>
+      <p:bold r:id="rId16"/>
+      <p:italic r:id="rId17"/>
+      <p:boldItalic r:id="rId18"/>
     </p:embeddedFont>
     <p:embeddedFont>
       <p:font typeface="Lato" panose="020F0502020204030203" pitchFamily="34" charset="77"/>
-      <p:regular r:id="rId18"/>
-      <p:bold r:id="rId19"/>
-      <p:italic r:id="rId20"/>
-      <p:boldItalic r:id="rId21"/>
+      <p:regular r:id="rId19"/>
+      <p:bold r:id="rId20"/>
+      <p:italic r:id="rId21"/>
+      <p:boldItalic r:id="rId22"/>
     </p:embeddedFont>
     <p:embeddedFont>
       <p:font typeface="Montserrat" pitchFamily="2" charset="77"/>
-      <p:regular r:id="rId22"/>
-      <p:bold r:id="rId23"/>
-      <p:italic r:id="rId24"/>
-      <p:boldItalic r:id="rId25"/>
+      <p:regular r:id="rId23"/>
+      <p:bold r:id="rId24"/>
+      <p:italic r:id="rId25"/>
+      <p:boldItalic r:id="rId26"/>
     </p:embeddedFont>
     <p:embeddedFont>
       <p:font typeface="Syncopate" panose="02000505000000020003" pitchFamily="2" charset="0"/>
-      <p:regular r:id="rId26"/>
-      <p:bold r:id="rId27"/>
+      <p:regular r:id="rId27"/>
+      <p:bold r:id="rId28"/>
     </p:embeddedFont>
   </p:embeddedFontLst>
   <p:defaultTextStyle>
@@ -8620,16 +8621,14 @@
     <p:bg>
       <p:bgPr>
         <a:solidFill>
-          <a:schemeClr val="bg2">
-            <a:lumMod val="75000"/>
-          </a:schemeClr>
+          <a:schemeClr val="bg1"/>
         </a:solidFill>
         <a:effectLst/>
       </p:bgPr>
     </p:bg>
     <p:spTree>
       <p:nvGrpSpPr>
-        <p:cNvPr id="1" name="Shape 133"/>
+        <p:cNvPr id="1" name=""/>
         <p:cNvGrpSpPr/>
         <p:nvPr/>
       </p:nvGrpSpPr>
@@ -8643,18 +8642,136 @@
       </p:grpSpPr>
       <p:sp>
         <p:nvSpPr>
-          <p:cNvPr id="134" name="Shape 134"/>
+          <p:cNvPr id="5" name="TextBox 4">
+            <a:extLst>
+              <a:ext uri="{FF2B5EF4-FFF2-40B4-BE49-F238E27FC236}">
+                <a16:creationId xmlns:a16="http://schemas.microsoft.com/office/drawing/2014/main" id="{6AD4F400-BCE8-AE45-A071-14F5E323B270}"/>
+              </a:ext>
+            </a:extLst>
+          </p:cNvPr>
+          <p:cNvSpPr txBox="1"/>
+          <p:nvPr/>
+        </p:nvSpPr>
+        <p:spPr>
+          <a:xfrm>
+            <a:off x="315066" y="678924"/>
+            <a:ext cx="8513869" cy="3785652"/>
+          </a:xfrm>
+          <a:prstGeom prst="rect">
+            <a:avLst/>
+          </a:prstGeom>
+          <a:noFill/>
+        </p:spPr>
+        <p:txBody>
+          <a:bodyPr wrap="none" rtlCol="0">
+            <a:spAutoFit/>
+          </a:bodyPr>
+          <a:lstStyle/>
+          <a:p>
+            <a:r>
+              <a:rPr lang="en-US" sz="4000" b="1" dirty="0"/>
+              <a:t>AGENDA</a:t>
+            </a:r>
+          </a:p>
+          <a:p>
+            <a:endParaRPr lang="en-US" sz="4000" b="1" dirty="0"/>
+          </a:p>
+          <a:p>
+            <a:r>
+              <a:rPr lang="en-US" sz="4000" dirty="0"/>
+              <a:t>15:30 – 15:45 presentation</a:t>
+            </a:r>
+          </a:p>
+          <a:p>
+            <a:r>
+              <a:rPr lang="en-US" sz="4000" dirty="0"/>
+              <a:t>15:45 – 16:00 bridging the gap</a:t>
+            </a:r>
+          </a:p>
+          <a:p>
+            <a:r>
+              <a:rPr lang="en-US" sz="4000" dirty="0"/>
+              <a:t>16:00 – 16:05 snacks</a:t>
+            </a:r>
+            <a:r>
+              <a:rPr lang="en-US" sz="2400" dirty="0"/>
+              <a:t> </a:t>
+            </a:r>
+            <a:r>
+              <a:rPr lang="en-US" sz="1600" dirty="0"/>
+              <a:t>(chance for non-</a:t>
+            </a:r>
+            <a:r>
+              <a:rPr lang="en-US" sz="1600" dirty="0" err="1"/>
+              <a:t>devs</a:t>
+            </a:r>
+            <a:r>
+              <a:rPr lang="en-US" sz="1600" dirty="0"/>
+              <a:t> to sneak away)</a:t>
+            </a:r>
+          </a:p>
+          <a:p>
+            <a:r>
+              <a:rPr lang="en-US" sz="4000" dirty="0"/>
+              <a:t>16:05 – 16:30 coding examples</a:t>
+            </a:r>
+          </a:p>
+        </p:txBody>
+      </p:sp>
+    </p:spTree>
+    <p:extLst>
+      <p:ext uri="{BB962C8B-B14F-4D97-AF65-F5344CB8AC3E}">
+        <p14:creationId xmlns:p14="http://schemas.microsoft.com/office/powerpoint/2010/main" val="4152457486"/>
+      </p:ext>
+    </p:extLst>
+  </p:cSld>
+  <p:clrMapOvr>
+    <a:masterClrMapping/>
+  </p:clrMapOvr>
+</p:sld>
+</file>
+
+<file path=ppt/slides/slide10.xml><?xml version="1.0" encoding="utf-8"?>
+<p:sld xmlns:a="http://schemas.openxmlformats.org/drawingml/2006/main" xmlns:r="http://schemas.openxmlformats.org/officeDocument/2006/relationships" xmlns:p="http://schemas.openxmlformats.org/presentationml/2006/main">
+  <p:cSld>
+    <p:bg>
+      <p:bgPr>
+        <a:solidFill>
+          <a:schemeClr val="bg2">
+            <a:lumMod val="75000"/>
+          </a:schemeClr>
+        </a:solidFill>
+        <a:effectLst/>
+      </p:bgPr>
+    </p:bg>
+    <p:spTree>
+      <p:nvGrpSpPr>
+        <p:cNvPr id="1" name="Shape 174"/>
+        <p:cNvGrpSpPr/>
+        <p:nvPr/>
+      </p:nvGrpSpPr>
+      <p:grpSpPr>
+        <a:xfrm>
+          <a:off x="0" y="0"/>
+          <a:ext cx="0" cy="0"/>
+          <a:chOff x="0" y="0"/>
+          <a:chExt cx="0" cy="0"/>
+        </a:xfrm>
+      </p:grpSpPr>
+      <p:sp>
+        <p:nvSpPr>
+          <p:cNvPr id="175" name="Shape 175"/>
           <p:cNvSpPr txBox="1">
             <a:spLocks noGrp="1"/>
           </p:cNvSpPr>
           <p:nvPr>
-            <p:ph type="ctrTitle" idx="4294967295"/>
+            <p:ph type="title" idx="4294967295"/>
           </p:nvPr>
         </p:nvSpPr>
         <p:spPr>
           <a:xfrm>
-            <a:off x="3537150" y="786560"/>
-            <a:ext cx="5017500" cy="2877947"/>
+            <a:off x="1297500" y="393750"/>
+            <a:ext cx="7038900" cy="914100"/>
           </a:xfrm>
           <a:prstGeom prst="rect">
             <a:avLst/>
@@ -8673,83 +8790,29 @@
               <a:buNone/>
             </a:pPr>
             <a:r>
-              <a:rPr lang="en" sz="4200" b="1" dirty="0">
-                <a:solidFill>
-                  <a:srgbClr val="DA2029"/>
-                </a:solidFill>
-              </a:rPr>
-              <a:t>Automated Functional Testing</a:t>
-            </a:r>
-            <a:br>
-              <a:rPr lang="en" sz="3000" dirty="0"/>
-            </a:br>
-            <a:r>
-              <a:rPr lang="en" sz="2400" dirty="0"/>
-              <a:t>Using Cucumber and Wiremock</a:t>
-            </a:r>
-          </a:p>
-        </p:txBody>
-      </p:sp>
-      <p:sp>
-        <p:nvSpPr>
-          <p:cNvPr id="135" name="Shape 135"/>
-          <p:cNvSpPr txBox="1">
-            <a:spLocks noGrp="1"/>
-          </p:cNvSpPr>
-          <p:nvPr>
-            <p:ph type="subTitle" idx="4294967295"/>
-          </p:nvPr>
-        </p:nvSpPr>
-        <p:spPr>
-          <a:xfrm>
-            <a:off x="5083950" y="3924925"/>
-            <a:ext cx="3470700" cy="506100"/>
-          </a:xfrm>
-          <a:prstGeom prst="rect">
-            <a:avLst/>
-          </a:prstGeom>
-        </p:spPr>
-        <p:txBody>
-          <a:bodyPr wrap="square" lIns="91425" tIns="91425" rIns="91425" bIns="91425" anchor="t" anchorCtr="0">
-            <a:noAutofit/>
-          </a:bodyPr>
-          <a:lstStyle/>
-          <a:p>
-            <a:pPr marL="0" lvl="0" indent="0" algn="r" rtl="0">
-              <a:spcBef>
-                <a:spcPts val="0"/>
-              </a:spcBef>
-              <a:buNone/>
-            </a:pPr>
-            <a:r>
               <a:rPr lang="en" dirty="0"/>
-              <a:t>Daniel Flores, 2018</a:t>
-            </a:r>
-            <a:br>
-              <a:rPr lang="en" dirty="0"/>
-            </a:br>
-            <a:endParaRPr lang="en" dirty="0"/>
+              <a:t>This is not what you’ve promised!</a:t>
+            </a:r>
           </a:p>
         </p:txBody>
       </p:sp>
       <p:pic>
         <p:nvPicPr>
-          <p:cNvPr id="136" name="Shape 136"/>
+          <p:cNvPr id="176" name="Shape 176"/>
           <p:cNvPicPr preferRelativeResize="0"/>
           <p:nvPr/>
         </p:nvPicPr>
-        <p:blipFill>
+        <p:blipFill rotWithShape="1">
           <a:blip r:embed="rId3">
             <a:alphaModFix/>
           </a:blip>
-          <a:stretch>
-            <a:fillRect/>
-          </a:stretch>
+          <a:srcRect b="59924"/>
+          <a:stretch/>
         </p:blipFill>
         <p:spPr>
-          <a:xfrm>
-            <a:off x="562600" y="0"/>
-            <a:ext cx="2582399" cy="5143501"/>
+          <a:xfrm rot="10800000" flipH="1">
+            <a:off x="-163775" y="0"/>
+            <a:ext cx="1638476" cy="1307850"/>
           </a:xfrm>
           <a:prstGeom prst="rect">
             <a:avLst/>
@@ -8760,59 +8823,42 @@
           </a:ln>
         </p:spPr>
       </p:pic>
-      <p:sp>
-        <p:nvSpPr>
-          <p:cNvPr id="137" name="Shape 137"/>
-          <p:cNvSpPr txBox="1"/>
+      <p:pic>
+        <p:nvPicPr>
+          <p:cNvPr id="2" name="Picture 1"/>
+          <p:cNvPicPr>
+            <a:picLocks noChangeAspect="1"/>
+          </p:cNvPicPr>
           <p:nvPr/>
-        </p:nvSpPr>
+        </p:nvPicPr>
+        <p:blipFill>
+          <a:blip r:embed="rId4">
+            <a:extLst>
+              <a:ext uri="{28A0092B-C50C-407E-A947-70E740481C1C}">
+                <a14:useLocalDpi xmlns:a14="http://schemas.microsoft.com/office/drawing/2010/main" val="0"/>
+              </a:ext>
+            </a:extLst>
+          </a:blip>
+          <a:stretch>
+            <a:fillRect/>
+          </a:stretch>
+        </p:blipFill>
         <p:spPr>
-          <a:xfrm rot="1843218">
-            <a:off x="1487131" y="751625"/>
-            <a:ext cx="920235" cy="195201"/>
+          <a:xfrm>
+            <a:off x="2559525" y="1815369"/>
+            <a:ext cx="4514850" cy="2524125"/>
           </a:xfrm>
           <a:prstGeom prst="rect">
             <a:avLst/>
           </a:prstGeom>
-          <a:noFill/>
-          <a:ln>
-            <a:noFill/>
-          </a:ln>
         </p:spPr>
-        <p:txBody>
-          <a:bodyPr wrap="square" lIns="91425" tIns="91425" rIns="91425" bIns="91425" anchor="ctr" anchorCtr="0">
-            <a:noAutofit/>
-          </a:bodyPr>
-          <a:lstStyle/>
-          <a:p>
-            <a:pPr marL="0" lvl="0" indent="0" rtl="0">
-              <a:lnSpc>
-                <a:spcPct val="115000"/>
-              </a:lnSpc>
-              <a:spcBef>
-                <a:spcPts val="0"/>
-              </a:spcBef>
-              <a:spcAft>
-                <a:spcPts val="1600"/>
-              </a:spcAft>
-              <a:buNone/>
-            </a:pPr>
-            <a:r>
-              <a:rPr lang="en" sz="600">
-                <a:solidFill>
-                  <a:srgbClr val="1C212B"/>
-                </a:solidFill>
-                <a:latin typeface="Syncopate"/>
-                <a:ea typeface="Syncopate"/>
-                <a:cs typeface="Syncopate"/>
-                <a:sym typeface="Syncopate"/>
-              </a:rPr>
-              <a:t>BLUE HARVEST</a:t>
-            </a:r>
-          </a:p>
-        </p:txBody>
-      </p:sp>
+      </p:pic>
     </p:spTree>
+    <p:extLst>
+      <p:ext uri="{BB962C8B-B14F-4D97-AF65-F5344CB8AC3E}">
+        <p14:creationId xmlns:p14="http://schemas.microsoft.com/office/powerpoint/2010/main" val="3876637902"/>
+      </p:ext>
+    </p:extLst>
   </p:cSld>
   <p:clrMapOvr>
     <a:masterClrMapping/>
@@ -8820,7 +8866,7 @@
 </p:sld>
 </file>
 
-<file path=ppt/slides/slide10.xml><?xml version="1.0" encoding="utf-8"?>
+<file path=ppt/slides/slide11.xml><?xml version="1.0" encoding="utf-8"?>
 <p:sld xmlns:a="http://schemas.openxmlformats.org/drawingml/2006/main" xmlns:r="http://schemas.openxmlformats.org/officeDocument/2006/relationships" xmlns:p="http://schemas.openxmlformats.org/presentationml/2006/main">
   <p:cSld>
     <p:bg>
@@ -8982,7 +9028,7 @@
 </p:sld>
 </file>
 
-<file path=ppt/slides/slide11.xml><?xml version="1.0" encoding="utf-8"?>
+<file path=ppt/slides/slide12.xml><?xml version="1.0" encoding="utf-8"?>
 <p:sld xmlns:a="http://schemas.openxmlformats.org/drawingml/2006/main" xmlns:r="http://schemas.openxmlformats.org/officeDocument/2006/relationships" xmlns:p="http://schemas.openxmlformats.org/presentationml/2006/main">
   <p:cSld>
     <p:bg>
@@ -9331,6 +9377,212 @@
 </file>
 
 <file path=ppt/slides/slide2.xml><?xml version="1.0" encoding="utf-8"?>
+<p:sld xmlns:a="http://schemas.openxmlformats.org/drawingml/2006/main" xmlns:r="http://schemas.openxmlformats.org/officeDocument/2006/relationships" xmlns:p="http://schemas.openxmlformats.org/presentationml/2006/main">
+  <p:cSld>
+    <p:bg>
+      <p:bgPr>
+        <a:solidFill>
+          <a:schemeClr val="bg2">
+            <a:lumMod val="75000"/>
+          </a:schemeClr>
+        </a:solidFill>
+        <a:effectLst/>
+      </p:bgPr>
+    </p:bg>
+    <p:spTree>
+      <p:nvGrpSpPr>
+        <p:cNvPr id="1" name="Shape 133"/>
+        <p:cNvGrpSpPr/>
+        <p:nvPr/>
+      </p:nvGrpSpPr>
+      <p:grpSpPr>
+        <a:xfrm>
+          <a:off x="0" y="0"/>
+          <a:ext cx="0" cy="0"/>
+          <a:chOff x="0" y="0"/>
+          <a:chExt cx="0" cy="0"/>
+        </a:xfrm>
+      </p:grpSpPr>
+      <p:sp>
+        <p:nvSpPr>
+          <p:cNvPr id="134" name="Shape 134"/>
+          <p:cNvSpPr txBox="1">
+            <a:spLocks noGrp="1"/>
+          </p:cNvSpPr>
+          <p:nvPr>
+            <p:ph type="ctrTitle" idx="4294967295"/>
+          </p:nvPr>
+        </p:nvSpPr>
+        <p:spPr>
+          <a:xfrm>
+            <a:off x="3537150" y="786560"/>
+            <a:ext cx="5017500" cy="2877947"/>
+          </a:xfrm>
+          <a:prstGeom prst="rect">
+            <a:avLst/>
+          </a:prstGeom>
+        </p:spPr>
+        <p:txBody>
+          <a:bodyPr wrap="square" lIns="91425" tIns="91425" rIns="91425" bIns="91425" anchor="t" anchorCtr="0">
+            <a:noAutofit/>
+          </a:bodyPr>
+          <a:lstStyle/>
+          <a:p>
+            <a:pPr marL="0" lvl="0" indent="0" rtl="0">
+              <a:spcBef>
+                <a:spcPts val="0"/>
+              </a:spcBef>
+              <a:buNone/>
+            </a:pPr>
+            <a:r>
+              <a:rPr lang="en" sz="4200" b="1" dirty="0">
+                <a:solidFill>
+                  <a:srgbClr val="DA2029"/>
+                </a:solidFill>
+              </a:rPr>
+              <a:t>Automated Functional Testing</a:t>
+            </a:r>
+            <a:br>
+              <a:rPr lang="en" sz="3000" dirty="0"/>
+            </a:br>
+            <a:r>
+              <a:rPr lang="en" sz="2400" dirty="0"/>
+              <a:t>Using Cucumber and Wiremock</a:t>
+            </a:r>
+          </a:p>
+        </p:txBody>
+      </p:sp>
+      <p:sp>
+        <p:nvSpPr>
+          <p:cNvPr id="135" name="Shape 135"/>
+          <p:cNvSpPr txBox="1">
+            <a:spLocks noGrp="1"/>
+          </p:cNvSpPr>
+          <p:nvPr>
+            <p:ph type="subTitle" idx="4294967295"/>
+          </p:nvPr>
+        </p:nvSpPr>
+        <p:spPr>
+          <a:xfrm>
+            <a:off x="5083950" y="3924925"/>
+            <a:ext cx="3470700" cy="506100"/>
+          </a:xfrm>
+          <a:prstGeom prst="rect">
+            <a:avLst/>
+          </a:prstGeom>
+        </p:spPr>
+        <p:txBody>
+          <a:bodyPr wrap="square" lIns="91425" tIns="91425" rIns="91425" bIns="91425" anchor="t" anchorCtr="0">
+            <a:noAutofit/>
+          </a:bodyPr>
+          <a:lstStyle/>
+          <a:p>
+            <a:pPr marL="0" lvl="0" indent="0" algn="r" rtl="0">
+              <a:spcBef>
+                <a:spcPts val="0"/>
+              </a:spcBef>
+              <a:buNone/>
+            </a:pPr>
+            <a:r>
+              <a:rPr lang="en" dirty="0"/>
+              <a:t>Daniel Flores, 2018</a:t>
+            </a:r>
+            <a:br>
+              <a:rPr lang="en" dirty="0"/>
+            </a:br>
+            <a:endParaRPr lang="en" dirty="0"/>
+          </a:p>
+        </p:txBody>
+      </p:sp>
+      <p:pic>
+        <p:nvPicPr>
+          <p:cNvPr id="136" name="Shape 136"/>
+          <p:cNvPicPr preferRelativeResize="0"/>
+          <p:nvPr/>
+        </p:nvPicPr>
+        <p:blipFill>
+          <a:blip r:embed="rId3">
+            <a:alphaModFix/>
+          </a:blip>
+          <a:stretch>
+            <a:fillRect/>
+          </a:stretch>
+        </p:blipFill>
+        <p:spPr>
+          <a:xfrm>
+            <a:off x="562600" y="0"/>
+            <a:ext cx="2582399" cy="5143501"/>
+          </a:xfrm>
+          <a:prstGeom prst="rect">
+            <a:avLst/>
+          </a:prstGeom>
+          <a:noFill/>
+          <a:ln>
+            <a:noFill/>
+          </a:ln>
+        </p:spPr>
+      </p:pic>
+      <p:sp>
+        <p:nvSpPr>
+          <p:cNvPr id="137" name="Shape 137"/>
+          <p:cNvSpPr txBox="1"/>
+          <p:nvPr/>
+        </p:nvSpPr>
+        <p:spPr>
+          <a:xfrm rot="1843218">
+            <a:off x="1487131" y="751625"/>
+            <a:ext cx="920235" cy="195201"/>
+          </a:xfrm>
+          <a:prstGeom prst="rect">
+            <a:avLst/>
+          </a:prstGeom>
+          <a:noFill/>
+          <a:ln>
+            <a:noFill/>
+          </a:ln>
+        </p:spPr>
+        <p:txBody>
+          <a:bodyPr wrap="square" lIns="91425" tIns="91425" rIns="91425" bIns="91425" anchor="ctr" anchorCtr="0">
+            <a:noAutofit/>
+          </a:bodyPr>
+          <a:lstStyle/>
+          <a:p>
+            <a:pPr marL="0" lvl="0" indent="0" rtl="0">
+              <a:lnSpc>
+                <a:spcPct val="115000"/>
+              </a:lnSpc>
+              <a:spcBef>
+                <a:spcPts val="0"/>
+              </a:spcBef>
+              <a:spcAft>
+                <a:spcPts val="1600"/>
+              </a:spcAft>
+              <a:buNone/>
+            </a:pPr>
+            <a:r>
+              <a:rPr lang="en" sz="600">
+                <a:solidFill>
+                  <a:srgbClr val="1C212B"/>
+                </a:solidFill>
+                <a:latin typeface="Syncopate"/>
+                <a:ea typeface="Syncopate"/>
+                <a:cs typeface="Syncopate"/>
+                <a:sym typeface="Syncopate"/>
+              </a:rPr>
+              <a:t>BLUE HARVEST</a:t>
+            </a:r>
+          </a:p>
+        </p:txBody>
+      </p:sp>
+    </p:spTree>
+  </p:cSld>
+  <p:clrMapOvr>
+    <a:masterClrMapping/>
+  </p:clrMapOvr>
+</p:sld>
+</file>
+
+<file path=ppt/slides/slide3.xml><?xml version="1.0" encoding="utf-8"?>
 <p:sld xmlns:a="http://schemas.openxmlformats.org/drawingml/2006/main" xmlns:r="http://schemas.openxmlformats.org/officeDocument/2006/relationships" xmlns:p="http://schemas.openxmlformats.org/presentationml/2006/main" show="0">
   <p:cSld>
     <p:bg>
@@ -9571,7 +9823,7 @@
 </p:sld>
 </file>
 
-<file path=ppt/slides/slide3.xml><?xml version="1.0" encoding="utf-8"?>
+<file path=ppt/slides/slide4.xml><?xml version="1.0" encoding="utf-8"?>
 <p:sld xmlns:a="http://schemas.openxmlformats.org/drawingml/2006/main" xmlns:r="http://schemas.openxmlformats.org/officeDocument/2006/relationships" xmlns:p="http://schemas.openxmlformats.org/presentationml/2006/main">
   <p:cSld>
     <p:bg>
@@ -9630,7 +9882,7 @@
               <a:buNone/>
             </a:pPr>
             <a:r>
-              <a:rPr lang="en" sz="3000" dirty="0"/>
+              <a:rPr lang="en" dirty="0"/>
               <a:t>(Automated) Test Pyramid</a:t>
             </a:r>
           </a:p>
@@ -10210,7 +10462,7 @@
 </p:sld>
 </file>
 
-<file path=ppt/slides/slide4.xml><?xml version="1.0" encoding="utf-8"?>
+<file path=ppt/slides/slide5.xml><?xml version="1.0" encoding="utf-8"?>
 <p:sld xmlns:a="http://schemas.openxmlformats.org/drawingml/2006/main" xmlns:r="http://schemas.openxmlformats.org/officeDocument/2006/relationships" xmlns:p="http://schemas.openxmlformats.org/presentationml/2006/main">
   <p:cSld>
     <p:bg>
@@ -10988,7 +11240,7 @@
 </p:sld>
 </file>
 
-<file path=ppt/slides/slide5.xml><?xml version="1.0" encoding="utf-8"?>
+<file path=ppt/slides/slide6.xml><?xml version="1.0" encoding="utf-8"?>
 <p:sld xmlns:a="http://schemas.openxmlformats.org/drawingml/2006/main" xmlns:r="http://schemas.openxmlformats.org/officeDocument/2006/relationships" xmlns:p="http://schemas.openxmlformats.org/presentationml/2006/main">
   <p:cSld>
     <p:bg>
@@ -11661,7 +11913,7 @@
 </p:sld>
 </file>
 
-<file path=ppt/slides/slide6.xml><?xml version="1.0" encoding="utf-8"?>
+<file path=ppt/slides/slide7.xml><?xml version="1.0" encoding="utf-8"?>
 <p:sld xmlns:a="http://schemas.openxmlformats.org/drawingml/2006/main" xmlns:r="http://schemas.openxmlformats.org/officeDocument/2006/relationships" xmlns:p="http://schemas.openxmlformats.org/presentationml/2006/main">
   <p:cSld>
     <p:bg>
@@ -11819,7 +12071,23 @@
             </a:r>
             <a:r>
               <a:rPr lang="nl-NL" sz="2000" dirty="0"/>
-              <a:t> BDD</a:t>
+              <a:t> </a:t>
+            </a:r>
+            <a:r>
+              <a:rPr lang="nl-NL" sz="2000" dirty="0" err="1"/>
+              <a:t>Behaviour</a:t>
+            </a:r>
+            <a:r>
+              <a:rPr lang="nl-NL" sz="2000" dirty="0"/>
+              <a:t> </a:t>
+            </a:r>
+            <a:r>
+              <a:rPr lang="nl-NL" sz="2000" dirty="0" err="1"/>
+              <a:t>Driven</a:t>
+            </a:r>
+            <a:r>
+              <a:rPr lang="nl-NL" sz="2000" dirty="0"/>
+              <a:t> Development</a:t>
             </a:r>
           </a:p>
           <a:p>
@@ -11868,7 +12136,15 @@
             </a:r>
             <a:r>
               <a:rPr lang="nl-NL" sz="2000" dirty="0"/>
-              <a:t> TDD</a:t>
+              <a:t> Test </a:t>
+            </a:r>
+            <a:r>
+              <a:rPr lang="nl-NL" sz="2000" dirty="0" err="1"/>
+              <a:t>Driven</a:t>
+            </a:r>
+            <a:r>
+              <a:rPr lang="nl-NL" sz="2000" dirty="0"/>
+              <a:t> Development</a:t>
             </a:r>
           </a:p>
           <a:p>
@@ -11994,7 +12270,7 @@
 </p:sld>
 </file>
 
-<file path=ppt/slides/slide7.xml><?xml version="1.0" encoding="utf-8"?>
+<file path=ppt/slides/slide8.xml><?xml version="1.0" encoding="utf-8"?>
 <p:sld xmlns:a="http://schemas.openxmlformats.org/drawingml/2006/main" xmlns:r="http://schemas.openxmlformats.org/officeDocument/2006/relationships" xmlns:p="http://schemas.openxmlformats.org/presentationml/2006/main">
   <p:cSld>
     <p:bg>
@@ -12512,7 +12788,7 @@
 </p:sld>
 </file>
 
-<file path=ppt/slides/slide8.xml><?xml version="1.0" encoding="utf-8"?>
+<file path=ppt/slides/slide9.xml><?xml version="1.0" encoding="utf-8"?>
 <p:sld xmlns:a="http://schemas.openxmlformats.org/drawingml/2006/main" xmlns:r="http://schemas.openxmlformats.org/officeDocument/2006/relationships" xmlns:p="http://schemas.openxmlformats.org/presentationml/2006/main">
   <p:cSld>
     <p:bg>
@@ -12974,141 +13250,6 @@
         </p:txBody>
       </p:sp>
     </p:spTree>
-  </p:cSld>
-  <p:clrMapOvr>
-    <a:masterClrMapping/>
-  </p:clrMapOvr>
-</p:sld>
-</file>
-
-<file path=ppt/slides/slide9.xml><?xml version="1.0" encoding="utf-8"?>
-<p:sld xmlns:a="http://schemas.openxmlformats.org/drawingml/2006/main" xmlns:r="http://schemas.openxmlformats.org/officeDocument/2006/relationships" xmlns:p="http://schemas.openxmlformats.org/presentationml/2006/main">
-  <p:cSld>
-    <p:bg>
-      <p:bgPr>
-        <a:solidFill>
-          <a:schemeClr val="bg2">
-            <a:lumMod val="75000"/>
-          </a:schemeClr>
-        </a:solidFill>
-        <a:effectLst/>
-      </p:bgPr>
-    </p:bg>
-    <p:spTree>
-      <p:nvGrpSpPr>
-        <p:cNvPr id="1" name="Shape 174"/>
-        <p:cNvGrpSpPr/>
-        <p:nvPr/>
-      </p:nvGrpSpPr>
-      <p:grpSpPr>
-        <a:xfrm>
-          <a:off x="0" y="0"/>
-          <a:ext cx="0" cy="0"/>
-          <a:chOff x="0" y="0"/>
-          <a:chExt cx="0" cy="0"/>
-        </a:xfrm>
-      </p:grpSpPr>
-      <p:sp>
-        <p:nvSpPr>
-          <p:cNvPr id="175" name="Shape 175"/>
-          <p:cNvSpPr txBox="1">
-            <a:spLocks noGrp="1"/>
-          </p:cNvSpPr>
-          <p:nvPr>
-            <p:ph type="title" idx="4294967295"/>
-          </p:nvPr>
-        </p:nvSpPr>
-        <p:spPr>
-          <a:xfrm>
-            <a:off x="1297500" y="393750"/>
-            <a:ext cx="7038900" cy="914100"/>
-          </a:xfrm>
-          <a:prstGeom prst="rect">
-            <a:avLst/>
-          </a:prstGeom>
-        </p:spPr>
-        <p:txBody>
-          <a:bodyPr wrap="square" lIns="91425" tIns="91425" rIns="91425" bIns="91425" anchor="t" anchorCtr="0">
-            <a:noAutofit/>
-          </a:bodyPr>
-          <a:lstStyle/>
-          <a:p>
-            <a:pPr marL="0" lvl="0" indent="0" rtl="0">
-              <a:spcBef>
-                <a:spcPts val="0"/>
-              </a:spcBef>
-              <a:buNone/>
-            </a:pPr>
-            <a:r>
-              <a:rPr lang="en" dirty="0"/>
-              <a:t>This is not what you’ve promised!</a:t>
-            </a:r>
-          </a:p>
-        </p:txBody>
-      </p:sp>
-      <p:pic>
-        <p:nvPicPr>
-          <p:cNvPr id="176" name="Shape 176"/>
-          <p:cNvPicPr preferRelativeResize="0"/>
-          <p:nvPr/>
-        </p:nvPicPr>
-        <p:blipFill rotWithShape="1">
-          <a:blip r:embed="rId3">
-            <a:alphaModFix/>
-          </a:blip>
-          <a:srcRect b="59924"/>
-          <a:stretch/>
-        </p:blipFill>
-        <p:spPr>
-          <a:xfrm rot="10800000" flipH="1">
-            <a:off x="-163775" y="0"/>
-            <a:ext cx="1638476" cy="1307850"/>
-          </a:xfrm>
-          <a:prstGeom prst="rect">
-            <a:avLst/>
-          </a:prstGeom>
-          <a:noFill/>
-          <a:ln>
-            <a:noFill/>
-          </a:ln>
-        </p:spPr>
-      </p:pic>
-      <p:pic>
-        <p:nvPicPr>
-          <p:cNvPr id="2" name="Picture 1"/>
-          <p:cNvPicPr>
-            <a:picLocks noChangeAspect="1"/>
-          </p:cNvPicPr>
-          <p:nvPr/>
-        </p:nvPicPr>
-        <p:blipFill>
-          <a:blip r:embed="rId4">
-            <a:extLst>
-              <a:ext uri="{28A0092B-C50C-407E-A947-70E740481C1C}">
-                <a14:useLocalDpi xmlns:a14="http://schemas.microsoft.com/office/drawing/2010/main" val="0"/>
-              </a:ext>
-            </a:extLst>
-          </a:blip>
-          <a:stretch>
-            <a:fillRect/>
-          </a:stretch>
-        </p:blipFill>
-        <p:spPr>
-          <a:xfrm>
-            <a:off x="2559525" y="1815369"/>
-            <a:ext cx="4514850" cy="2524125"/>
-          </a:xfrm>
-          <a:prstGeom prst="rect">
-            <a:avLst/>
-          </a:prstGeom>
-        </p:spPr>
-      </p:pic>
-    </p:spTree>
-    <p:extLst>
-      <p:ext uri="{BB962C8B-B14F-4D97-AF65-F5344CB8AC3E}">
-        <p14:creationId xmlns:p14="http://schemas.microsoft.com/office/powerpoint/2010/main" val="3876637902"/>
-      </p:ext>
-    </p:extLst>
   </p:cSld>
   <p:clrMapOvr>
     <a:masterClrMapping/>

</xml_diff>

<commit_message>
missing imports added again
</commit_message>
<xml_diff>
--- a/automated_functional_testing.pptx
+++ b/automated_functional_testing.pptx
@@ -10564,6 +10564,16 @@
         </p:nvPicPr>
         <p:blipFill>
           <a:blip r:embed="rId4">
+            <a:clrChange>
+              <a:clrFrom>
+                <a:srgbClr val="FFFFFF"/>
+              </a:clrFrom>
+              <a:clrTo>
+                <a:srgbClr val="FFFFFF">
+                  <a:alpha val="0"/>
+                </a:srgbClr>
+              </a:clrTo>
+            </a:clrChange>
             <a:extLst>
               <a:ext uri="{28A0092B-C50C-407E-A947-70E740481C1C}">
                 <a14:useLocalDpi xmlns:a14="http://schemas.microsoft.com/office/drawing/2010/main" val="0"/>
@@ -10576,38 +10586,8 @@
         </p:blipFill>
         <p:spPr>
           <a:xfrm>
-            <a:off x="552913" y="1701600"/>
+            <a:off x="690816" y="1783349"/>
             <a:ext cx="1640840" cy="972820"/>
-          </a:xfrm>
-          <a:prstGeom prst="rect">
-            <a:avLst/>
-          </a:prstGeom>
-        </p:spPr>
-      </p:pic>
-      <p:pic>
-        <p:nvPicPr>
-          <p:cNvPr id="3" name="Picture 2"/>
-          <p:cNvPicPr>
-            <a:picLocks noChangeAspect="1"/>
-          </p:cNvPicPr>
-          <p:nvPr/>
-        </p:nvPicPr>
-        <p:blipFill>
-          <a:blip r:embed="rId5">
-            <a:extLst>
-              <a:ext uri="{28A0092B-C50C-407E-A947-70E740481C1C}">
-                <a14:useLocalDpi xmlns:a14="http://schemas.microsoft.com/office/drawing/2010/main" val="0"/>
-              </a:ext>
-            </a:extLst>
-          </a:blip>
-          <a:stretch>
-            <a:fillRect/>
-          </a:stretch>
-        </p:blipFill>
-        <p:spPr>
-          <a:xfrm>
-            <a:off x="946136" y="3068169"/>
-            <a:ext cx="854393" cy="854393"/>
           </a:xfrm>
           <a:prstGeom prst="rect">
             <a:avLst/>
@@ -11080,15 +11060,15 @@
         <p:nvCxnSpPr>
           <p:cNvPr id="7" name="Straight Arrow Connector 6"/>
           <p:cNvCxnSpPr>
-            <a:stCxn id="2" idx="3"/>
+            <a:cxnSpLocks/>
             <a:endCxn id="11" idx="7"/>
           </p:cNvCxnSpPr>
           <p:nvPr/>
         </p:nvCxnSpPr>
         <p:spPr>
           <a:xfrm>
-            <a:off x="2193753" y="2188010"/>
-            <a:ext cx="1226234" cy="213402"/>
+            <a:off x="1870364" y="2235844"/>
+            <a:ext cx="1549623" cy="165568"/>
           </a:xfrm>
           <a:prstGeom prst="straightConnector1">
             <a:avLst/>
@@ -11119,15 +11099,16 @@
         <p:nvCxnSpPr>
           <p:cNvPr id="23" name="Straight Arrow Connector 22"/>
           <p:cNvCxnSpPr>
-            <a:stCxn id="3" idx="3"/>
+            <a:cxnSpLocks/>
+            <a:stCxn id="12" idx="3"/>
             <a:endCxn id="11" idx="1"/>
           </p:cNvCxnSpPr>
           <p:nvPr/>
         </p:nvCxnSpPr>
         <p:spPr>
           <a:xfrm flipV="1">
-            <a:off x="1800529" y="2616938"/>
-            <a:ext cx="1619458" cy="878428"/>
+            <a:off x="1800528" y="2616938"/>
+            <a:ext cx="1619459" cy="893430"/>
           </a:xfrm>
           <a:prstGeom prst="straightConnector1">
             <a:avLst/>
@@ -11232,6 +11213,36 @@
           </a:fontRef>
         </p:style>
       </p:cxnSp>
+      <p:pic>
+        <p:nvPicPr>
+          <p:cNvPr id="12" name="Picture 11">
+            <a:extLst>
+              <a:ext uri="{FF2B5EF4-FFF2-40B4-BE49-F238E27FC236}">
+                <a16:creationId xmlns:a16="http://schemas.microsoft.com/office/drawing/2014/main" id="{8D05FDFF-F7EF-E142-9585-F2056A4F2850}"/>
+              </a:ext>
+            </a:extLst>
+          </p:cNvPr>
+          <p:cNvPicPr>
+            <a:picLocks noChangeAspect="1"/>
+          </p:cNvPicPr>
+          <p:nvPr/>
+        </p:nvPicPr>
+        <p:blipFill>
+          <a:blip r:embed="rId5"/>
+          <a:stretch>
+            <a:fillRect/>
+          </a:stretch>
+        </p:blipFill>
+        <p:spPr>
+          <a:xfrm>
+            <a:off x="1018937" y="3088309"/>
+            <a:ext cx="781591" cy="844118"/>
+          </a:xfrm>
+          <a:prstGeom prst="rect">
+            <a:avLst/>
+          </a:prstGeom>
+        </p:spPr>
+      </p:pic>
     </p:spTree>
   </p:cSld>
   <p:clrMapOvr>

</xml_diff>